<commit_message>
Commit 10th march 2023
</commit_message>
<xml_diff>
--- a/DOCS/Soutenance Projet 09.pptx
+++ b/DOCS/Soutenance Projet 09.pptx
@@ -164,7 +164,7 @@
           <a:noFill/>
           <a:extLst>
             <a:ext uri="{909E8E84-426E-40dd-AFC4-6F175D3DCCD1}">
-              <a14:hiddenFill xmlns:a14="http://schemas.microsoft.com/office/drawing/2010/main" xmlns="">
+              <a14:hiddenFill xmlns="" xmlns:a14="http://schemas.microsoft.com/office/drawing/2010/main">
                 <a:solidFill>
                   <a:srgbClr val="FFFFFF"/>
                 </a:solidFill>
@@ -224,7 +224,7 @@
             </a:ln>
             <a:extLst>
               <a:ext uri="{91240B29-F687-4f45-9708-019B960494DF}">
-                <a14:hiddenLine xmlns:a14="http://schemas.microsoft.com/office/drawing/2010/main" xmlns="" w="9525">
+                <a14:hiddenLine xmlns="" xmlns:a14="http://schemas.microsoft.com/office/drawing/2010/main" w="9525">
                   <a:solidFill>
                     <a:srgbClr val="000000"/>
                   </a:solidFill>
@@ -314,7 +314,7 @@
             </a:ln>
             <a:extLst>
               <a:ext uri="{91240B29-F687-4f45-9708-019B960494DF}">
-                <a14:hiddenLine xmlns:a14="http://schemas.microsoft.com/office/drawing/2010/main" xmlns="" w="9525">
+                <a14:hiddenLine xmlns="" xmlns:a14="http://schemas.microsoft.com/office/drawing/2010/main" w="9525">
                   <a:solidFill>
                     <a:srgbClr val="000000"/>
                   </a:solidFill>
@@ -404,7 +404,7 @@
             </a:ln>
             <a:extLst>
               <a:ext uri="{91240B29-F687-4f45-9708-019B960494DF}">
-                <a14:hiddenLine xmlns:a14="http://schemas.microsoft.com/office/drawing/2010/main" xmlns="" w="9525">
+                <a14:hiddenLine xmlns="" xmlns:a14="http://schemas.microsoft.com/office/drawing/2010/main" w="9525">
                   <a:solidFill>
                     <a:srgbClr val="000000"/>
                   </a:solidFill>
@@ -438,7 +438,7 @@
             </a:ln>
             <a:extLst>
               <a:ext uri="{91240B29-F687-4f45-9708-019B960494DF}">
-                <a14:hiddenLine xmlns:a14="http://schemas.microsoft.com/office/drawing/2010/main" xmlns="" w="9525">
+                <a14:hiddenLine xmlns="" xmlns:a14="http://schemas.microsoft.com/office/drawing/2010/main" w="9525">
                   <a:solidFill>
                     <a:srgbClr val="000000"/>
                   </a:solidFill>
@@ -528,7 +528,7 @@
             </a:ln>
             <a:extLst>
               <a:ext uri="{91240B29-F687-4f45-9708-019B960494DF}">
-                <a14:hiddenLine xmlns:a14="http://schemas.microsoft.com/office/drawing/2010/main" xmlns="" w="9525">
+                <a14:hiddenLine xmlns="" xmlns:a14="http://schemas.microsoft.com/office/drawing/2010/main" w="9525">
                   <a:solidFill>
                     <a:srgbClr val="000000"/>
                   </a:solidFill>
@@ -590,7 +590,7 @@
             </a:ln>
             <a:extLst>
               <a:ext uri="{91240B29-F687-4f45-9708-019B960494DF}">
-                <a14:hiddenLine xmlns:a14="http://schemas.microsoft.com/office/drawing/2010/main" xmlns="" w="9525">
+                <a14:hiddenLine xmlns="" xmlns:a14="http://schemas.microsoft.com/office/drawing/2010/main" w="9525">
                   <a:solidFill>
                     <a:srgbClr val="000000"/>
                   </a:solidFill>
@@ -652,7 +652,7 @@
             </a:ln>
             <a:extLst>
               <a:ext uri="{91240B29-F687-4f45-9708-019B960494DF}">
-                <a14:hiddenLine xmlns:a14="http://schemas.microsoft.com/office/drawing/2010/main" xmlns="" w="9525">
+                <a14:hiddenLine xmlns="" xmlns:a14="http://schemas.microsoft.com/office/drawing/2010/main" w="9525">
                   <a:solidFill>
                     <a:srgbClr val="000000"/>
                   </a:solidFill>
@@ -742,7 +742,7 @@
             </a:ln>
             <a:extLst>
               <a:ext uri="{91240B29-F687-4f45-9708-019B960494DF}">
-                <a14:hiddenLine xmlns:a14="http://schemas.microsoft.com/office/drawing/2010/main" xmlns="" w="9525">
+                <a14:hiddenLine xmlns="" xmlns:a14="http://schemas.microsoft.com/office/drawing/2010/main" w="9525">
                   <a:solidFill>
                     <a:srgbClr val="000000"/>
                   </a:solidFill>
@@ -804,7 +804,7 @@
             </a:ln>
             <a:extLst>
               <a:ext uri="{91240B29-F687-4f45-9708-019B960494DF}">
-                <a14:hiddenLine xmlns:a14="http://schemas.microsoft.com/office/drawing/2010/main" xmlns="" w="9525">
+                <a14:hiddenLine xmlns="" xmlns:a14="http://schemas.microsoft.com/office/drawing/2010/main" w="9525">
                   <a:solidFill>
                     <a:srgbClr val="000000"/>
                   </a:solidFill>
@@ -866,7 +866,7 @@
             </a:ln>
             <a:extLst>
               <a:ext uri="{91240B29-F687-4f45-9708-019B960494DF}">
-                <a14:hiddenLine xmlns:a14="http://schemas.microsoft.com/office/drawing/2010/main" xmlns="" w="9525">
+                <a14:hiddenLine xmlns="" xmlns:a14="http://schemas.microsoft.com/office/drawing/2010/main" w="9525">
                   <a:solidFill>
                     <a:srgbClr val="000000"/>
                   </a:solidFill>
@@ -956,7 +956,7 @@
             </a:ln>
             <a:extLst>
               <a:ext uri="{91240B29-F687-4f45-9708-019B960494DF}">
-                <a14:hiddenLine xmlns:a14="http://schemas.microsoft.com/office/drawing/2010/main" xmlns="" w="9525">
+                <a14:hiddenLine xmlns="" xmlns:a14="http://schemas.microsoft.com/office/drawing/2010/main" w="9525">
                   <a:solidFill>
                     <a:srgbClr val="000000"/>
                   </a:solidFill>
@@ -1046,7 +1046,7 @@
             </a:ln>
             <a:extLst>
               <a:ext uri="{91240B29-F687-4f45-9708-019B960494DF}">
-                <a14:hiddenLine xmlns:a14="http://schemas.microsoft.com/office/drawing/2010/main" xmlns="" w="9525">
+                <a14:hiddenLine xmlns="" xmlns:a14="http://schemas.microsoft.com/office/drawing/2010/main" w="9525">
                   <a:solidFill>
                     <a:srgbClr val="000000"/>
                   </a:solidFill>
@@ -1108,7 +1108,7 @@
             </a:ln>
             <a:extLst>
               <a:ext uri="{91240B29-F687-4f45-9708-019B960494DF}">
-                <a14:hiddenLine xmlns:a14="http://schemas.microsoft.com/office/drawing/2010/main" xmlns="" w="9525">
+                <a14:hiddenLine xmlns="" xmlns:a14="http://schemas.microsoft.com/office/drawing/2010/main" w="9525">
                   <a:solidFill>
                     <a:srgbClr val="000000"/>
                   </a:solidFill>
@@ -1218,7 +1218,7 @@
             </a:ln>
             <a:extLst>
               <a:ext uri="{91240B29-F687-4f45-9708-019B960494DF}">
-                <a14:hiddenLine xmlns:a14="http://schemas.microsoft.com/office/drawing/2010/main" xmlns="" w="9525">
+                <a14:hiddenLine xmlns="" xmlns:a14="http://schemas.microsoft.com/office/drawing/2010/main" w="9525">
                   <a:solidFill>
                     <a:srgbClr val="000000"/>
                   </a:solidFill>
@@ -1280,7 +1280,7 @@
             </a:ln>
             <a:extLst>
               <a:ext uri="{91240B29-F687-4f45-9708-019B960494DF}">
-                <a14:hiddenLine xmlns:a14="http://schemas.microsoft.com/office/drawing/2010/main" xmlns="" w="9525">
+                <a14:hiddenLine xmlns="" xmlns:a14="http://schemas.microsoft.com/office/drawing/2010/main" w="9525">
                   <a:solidFill>
                     <a:srgbClr val="000000"/>
                   </a:solidFill>
@@ -1370,7 +1370,7 @@
             </a:ln>
             <a:extLst>
               <a:ext uri="{91240B29-F687-4f45-9708-019B960494DF}">
-                <a14:hiddenLine xmlns:a14="http://schemas.microsoft.com/office/drawing/2010/main" xmlns="" w="9525">
+                <a14:hiddenLine xmlns="" xmlns:a14="http://schemas.microsoft.com/office/drawing/2010/main" w="9525">
                   <a:solidFill>
                     <a:srgbClr val="000000"/>
                   </a:solidFill>
@@ -1460,7 +1460,7 @@
             </a:ln>
             <a:extLst>
               <a:ext uri="{91240B29-F687-4f45-9708-019B960494DF}">
-                <a14:hiddenLine xmlns:a14="http://schemas.microsoft.com/office/drawing/2010/main" xmlns="" w="9525">
+                <a14:hiddenLine xmlns="" xmlns:a14="http://schemas.microsoft.com/office/drawing/2010/main" w="9525">
                   <a:solidFill>
                     <a:srgbClr val="000000"/>
                   </a:solidFill>
@@ -1522,7 +1522,7 @@
             </a:ln>
             <a:extLst>
               <a:ext uri="{91240B29-F687-4f45-9708-019B960494DF}">
-                <a14:hiddenLine xmlns:a14="http://schemas.microsoft.com/office/drawing/2010/main" xmlns="" w="9525">
+                <a14:hiddenLine xmlns="" xmlns:a14="http://schemas.microsoft.com/office/drawing/2010/main" w="9525">
                   <a:solidFill>
                     <a:srgbClr val="000000"/>
                   </a:solidFill>
@@ -1612,7 +1612,7 @@
             </a:ln>
             <a:extLst>
               <a:ext uri="{91240B29-F687-4f45-9708-019B960494DF}">
-                <a14:hiddenLine xmlns:a14="http://schemas.microsoft.com/office/drawing/2010/main" xmlns="" w="9525">
+                <a14:hiddenLine xmlns="" xmlns:a14="http://schemas.microsoft.com/office/drawing/2010/main" w="9525">
                   <a:solidFill>
                     <a:srgbClr val="000000"/>
                   </a:solidFill>
@@ -1702,7 +1702,7 @@
             </a:ln>
             <a:extLst>
               <a:ext uri="{91240B29-F687-4f45-9708-019B960494DF}">
-                <a14:hiddenLine xmlns:a14="http://schemas.microsoft.com/office/drawing/2010/main" xmlns="" w="9525">
+                <a14:hiddenLine xmlns="" xmlns:a14="http://schemas.microsoft.com/office/drawing/2010/main" w="9525">
                   <a:solidFill>
                     <a:srgbClr val="000000"/>
                   </a:solidFill>
@@ -1758,7 +1758,7 @@
             </a:ln>
             <a:extLst>
               <a:ext uri="{91240B29-F687-4f45-9708-019B960494DF}">
-                <a14:hiddenLine xmlns:a14="http://schemas.microsoft.com/office/drawing/2010/main" xmlns="" w="9525">
+                <a14:hiddenLine xmlns="" xmlns:a14="http://schemas.microsoft.com/office/drawing/2010/main" w="9525">
                   <a:solidFill>
                     <a:srgbClr val="000000"/>
                   </a:solidFill>
@@ -1848,7 +1848,7 @@
             </a:ln>
             <a:extLst>
               <a:ext uri="{91240B29-F687-4f45-9708-019B960494DF}">
-                <a14:hiddenLine xmlns:a14="http://schemas.microsoft.com/office/drawing/2010/main" xmlns="" w="9525">
+                <a14:hiddenLine xmlns="" xmlns:a14="http://schemas.microsoft.com/office/drawing/2010/main" w="9525">
                   <a:solidFill>
                     <a:srgbClr val="000000"/>
                   </a:solidFill>
@@ -1904,7 +1904,7 @@
             </a:ln>
             <a:extLst>
               <a:ext uri="{91240B29-F687-4f45-9708-019B960494DF}">
-                <a14:hiddenLine xmlns:a14="http://schemas.microsoft.com/office/drawing/2010/main" xmlns="" w="9525">
+                <a14:hiddenLine xmlns="" xmlns:a14="http://schemas.microsoft.com/office/drawing/2010/main" w="9525">
                   <a:solidFill>
                     <a:srgbClr val="000000"/>
                   </a:solidFill>
@@ -1994,7 +1994,7 @@
             </a:ln>
             <a:extLst>
               <a:ext uri="{91240B29-F687-4f45-9708-019B960494DF}">
-                <a14:hiddenLine xmlns:a14="http://schemas.microsoft.com/office/drawing/2010/main" xmlns="" w="9525">
+                <a14:hiddenLine xmlns="" xmlns:a14="http://schemas.microsoft.com/office/drawing/2010/main" w="9525">
                   <a:solidFill>
                     <a:srgbClr val="000000"/>
                   </a:solidFill>
@@ -2062,7 +2062,7 @@
             </a:ln>
             <a:extLst>
               <a:ext uri="{91240B29-F687-4f45-9708-019B960494DF}">
-                <a14:hiddenLine xmlns:a14="http://schemas.microsoft.com/office/drawing/2010/main" xmlns="" w="9525">
+                <a14:hiddenLine xmlns="" xmlns:a14="http://schemas.microsoft.com/office/drawing/2010/main" w="9525">
                   <a:solidFill>
                     <a:srgbClr val="000000"/>
                   </a:solidFill>
@@ -2152,7 +2152,7 @@
             </a:ln>
             <a:extLst>
               <a:ext uri="{91240B29-F687-4f45-9708-019B960494DF}">
-                <a14:hiddenLine xmlns:a14="http://schemas.microsoft.com/office/drawing/2010/main" xmlns="" w="9525">
+                <a14:hiddenLine xmlns="" xmlns:a14="http://schemas.microsoft.com/office/drawing/2010/main" w="9525">
                   <a:solidFill>
                     <a:srgbClr val="000000"/>
                   </a:solidFill>
@@ -2220,7 +2220,7 @@
             </a:ln>
             <a:extLst>
               <a:ext uri="{91240B29-F687-4f45-9708-019B960494DF}">
-                <a14:hiddenLine xmlns:a14="http://schemas.microsoft.com/office/drawing/2010/main" xmlns="" w="9525">
+                <a14:hiddenLine xmlns="" xmlns:a14="http://schemas.microsoft.com/office/drawing/2010/main" w="9525">
                   <a:solidFill>
                     <a:srgbClr val="000000"/>
                   </a:solidFill>
@@ -2310,7 +2310,7 @@
             </a:ln>
             <a:extLst>
               <a:ext uri="{91240B29-F687-4f45-9708-019B960494DF}">
-                <a14:hiddenLine xmlns:a14="http://schemas.microsoft.com/office/drawing/2010/main" xmlns="" w="9525">
+                <a14:hiddenLine xmlns="" xmlns:a14="http://schemas.microsoft.com/office/drawing/2010/main" w="9525">
                   <a:solidFill>
                     <a:srgbClr val="000000"/>
                   </a:solidFill>
@@ -2344,7 +2344,7 @@
             </a:ln>
             <a:extLst>
               <a:ext uri="{91240B29-F687-4f45-9708-019B960494DF}">
-                <a14:hiddenLine xmlns:a14="http://schemas.microsoft.com/office/drawing/2010/main" xmlns="" w="9525">
+                <a14:hiddenLine xmlns="" xmlns:a14="http://schemas.microsoft.com/office/drawing/2010/main" w="9525">
                   <a:solidFill>
                     <a:srgbClr val="000000"/>
                   </a:solidFill>
@@ -2434,7 +2434,7 @@
             </a:ln>
             <a:extLst>
               <a:ext uri="{91240B29-F687-4f45-9708-019B960494DF}">
-                <a14:hiddenLine xmlns:a14="http://schemas.microsoft.com/office/drawing/2010/main" xmlns="" w="9525">
+                <a14:hiddenLine xmlns="" xmlns:a14="http://schemas.microsoft.com/office/drawing/2010/main" w="9525">
                   <a:solidFill>
                     <a:srgbClr val="000000"/>
                   </a:solidFill>
@@ -2496,7 +2496,7 @@
             </a:ln>
             <a:extLst>
               <a:ext uri="{91240B29-F687-4f45-9708-019B960494DF}">
-                <a14:hiddenLine xmlns:a14="http://schemas.microsoft.com/office/drawing/2010/main" xmlns="" w="9525">
+                <a14:hiddenLine xmlns="" xmlns:a14="http://schemas.microsoft.com/office/drawing/2010/main" w="9525">
                   <a:solidFill>
                     <a:srgbClr val="000000"/>
                   </a:solidFill>
@@ -2558,7 +2558,7 @@
             </a:ln>
             <a:extLst>
               <a:ext uri="{91240B29-F687-4f45-9708-019B960494DF}">
-                <a14:hiddenLine xmlns:a14="http://schemas.microsoft.com/office/drawing/2010/main" xmlns="" w="9525">
+                <a14:hiddenLine xmlns="" xmlns:a14="http://schemas.microsoft.com/office/drawing/2010/main" w="9525">
                   <a:solidFill>
                     <a:srgbClr val="000000"/>
                   </a:solidFill>
@@ -2648,7 +2648,7 @@
             </a:ln>
             <a:extLst>
               <a:ext uri="{91240B29-F687-4f45-9708-019B960494DF}">
-                <a14:hiddenLine xmlns:a14="http://schemas.microsoft.com/office/drawing/2010/main" xmlns="" w="9525">
+                <a14:hiddenLine xmlns="" xmlns:a14="http://schemas.microsoft.com/office/drawing/2010/main" w="9525">
                   <a:solidFill>
                     <a:srgbClr val="000000"/>
                   </a:solidFill>
@@ -2716,7 +2716,7 @@
             </a:ln>
             <a:extLst>
               <a:ext uri="{91240B29-F687-4f45-9708-019B960494DF}">
-                <a14:hiddenLine xmlns:a14="http://schemas.microsoft.com/office/drawing/2010/main" xmlns="" w="9525">
+                <a14:hiddenLine xmlns="" xmlns:a14="http://schemas.microsoft.com/office/drawing/2010/main" w="9525">
                   <a:solidFill>
                     <a:srgbClr val="000000"/>
                   </a:solidFill>
@@ -2778,7 +2778,7 @@
             </a:ln>
             <a:extLst>
               <a:ext uri="{91240B29-F687-4f45-9708-019B960494DF}">
-                <a14:hiddenLine xmlns:a14="http://schemas.microsoft.com/office/drawing/2010/main" xmlns="" w="9525">
+                <a14:hiddenLine xmlns="" xmlns:a14="http://schemas.microsoft.com/office/drawing/2010/main" w="9525">
                   <a:solidFill>
                     <a:srgbClr val="000000"/>
                   </a:solidFill>
@@ -2868,7 +2868,7 @@
             </a:ln>
             <a:extLst>
               <a:ext uri="{91240B29-F687-4f45-9708-019B960494DF}">
-                <a14:hiddenLine xmlns:a14="http://schemas.microsoft.com/office/drawing/2010/main" xmlns="" w="9525">
+                <a14:hiddenLine xmlns="" xmlns:a14="http://schemas.microsoft.com/office/drawing/2010/main" w="9525">
                   <a:solidFill>
                     <a:srgbClr val="000000"/>
                   </a:solidFill>
@@ -2930,7 +2930,7 @@
             </a:ln>
             <a:extLst>
               <a:ext uri="{91240B29-F687-4f45-9708-019B960494DF}">
-                <a14:hiddenLine xmlns:a14="http://schemas.microsoft.com/office/drawing/2010/main" xmlns="" w="9525">
+                <a14:hiddenLine xmlns="" xmlns:a14="http://schemas.microsoft.com/office/drawing/2010/main" w="9525">
                   <a:solidFill>
                     <a:srgbClr val="000000"/>
                   </a:solidFill>
@@ -3020,7 +3020,7 @@
             </a:ln>
             <a:extLst>
               <a:ext uri="{91240B29-F687-4f45-9708-019B960494DF}">
-                <a14:hiddenLine xmlns:a14="http://schemas.microsoft.com/office/drawing/2010/main" xmlns="" w="9525">
+                <a14:hiddenLine xmlns="" xmlns:a14="http://schemas.microsoft.com/office/drawing/2010/main" w="9525">
                   <a:solidFill>
                     <a:srgbClr val="000000"/>
                   </a:solidFill>
@@ -3082,7 +3082,7 @@
             </a:ln>
             <a:extLst>
               <a:ext uri="{91240B29-F687-4f45-9708-019B960494DF}">
-                <a14:hiddenLine xmlns:a14="http://schemas.microsoft.com/office/drawing/2010/main" xmlns="" w="9525">
+                <a14:hiddenLine xmlns="" xmlns:a14="http://schemas.microsoft.com/office/drawing/2010/main" w="9525">
                   <a:solidFill>
                     <a:srgbClr val="000000"/>
                   </a:solidFill>
@@ -3172,7 +3172,7 @@
             </a:ln>
             <a:extLst>
               <a:ext uri="{91240B29-F687-4f45-9708-019B960494DF}">
-                <a14:hiddenLine xmlns:a14="http://schemas.microsoft.com/office/drawing/2010/main" xmlns="" w="9525">
+                <a14:hiddenLine xmlns="" xmlns:a14="http://schemas.microsoft.com/office/drawing/2010/main" w="9525">
                   <a:solidFill>
                     <a:srgbClr val="000000"/>
                   </a:solidFill>
@@ -3206,7 +3206,7 @@
             </a:ln>
             <a:extLst>
               <a:ext uri="{91240B29-F687-4f45-9708-019B960494DF}">
-                <a14:hiddenLine xmlns:a14="http://schemas.microsoft.com/office/drawing/2010/main" xmlns="" w="9525">
+                <a14:hiddenLine xmlns="" xmlns:a14="http://schemas.microsoft.com/office/drawing/2010/main" w="9525">
                   <a:solidFill>
                     <a:srgbClr val="000000"/>
                   </a:solidFill>
@@ -3271,7 +3271,7 @@
             </a:ln>
             <a:extLst>
               <a:ext uri="{91240B29-F687-4f45-9708-019B960494DF}">
-                <a14:hiddenLine xmlns:a14="http://schemas.microsoft.com/office/drawing/2010/main" xmlns="" w="9525">
+                <a14:hiddenLine xmlns="" xmlns:a14="http://schemas.microsoft.com/office/drawing/2010/main" w="9525">
                   <a:solidFill>
                     <a:srgbClr val="000000"/>
                   </a:solidFill>
@@ -3361,7 +3361,7 @@
             </a:ln>
             <a:extLst>
               <a:ext uri="{91240B29-F687-4f45-9708-019B960494DF}">
-                <a14:hiddenLine xmlns:a14="http://schemas.microsoft.com/office/drawing/2010/main" xmlns="" w="9525">
+                <a14:hiddenLine xmlns="" xmlns:a14="http://schemas.microsoft.com/office/drawing/2010/main" w="9525">
                   <a:solidFill>
                     <a:srgbClr val="000000"/>
                   </a:solidFill>
@@ -3423,7 +3423,7 @@
             </a:ln>
             <a:extLst>
               <a:ext uri="{91240B29-F687-4f45-9708-019B960494DF}">
-                <a14:hiddenLine xmlns:a14="http://schemas.microsoft.com/office/drawing/2010/main" xmlns="" w="9525">
+                <a14:hiddenLine xmlns="" xmlns:a14="http://schemas.microsoft.com/office/drawing/2010/main" w="9525">
                   <a:solidFill>
                     <a:srgbClr val="000000"/>
                   </a:solidFill>
@@ -3513,7 +3513,7 @@
             </a:ln>
             <a:extLst>
               <a:ext uri="{91240B29-F687-4f45-9708-019B960494DF}">
-                <a14:hiddenLine xmlns:a14="http://schemas.microsoft.com/office/drawing/2010/main" xmlns="" w="9525">
+                <a14:hiddenLine xmlns="" xmlns:a14="http://schemas.microsoft.com/office/drawing/2010/main" w="9525">
                   <a:solidFill>
                     <a:srgbClr val="000000"/>
                   </a:solidFill>
@@ -3603,7 +3603,7 @@
             </a:ln>
             <a:extLst>
               <a:ext uri="{91240B29-F687-4f45-9708-019B960494DF}">
-                <a14:hiddenLine xmlns:a14="http://schemas.microsoft.com/office/drawing/2010/main" xmlns="" w="9525">
+                <a14:hiddenLine xmlns="" xmlns:a14="http://schemas.microsoft.com/office/drawing/2010/main" w="9525">
                   <a:solidFill>
                     <a:srgbClr val="000000"/>
                   </a:solidFill>
@@ -3668,7 +3668,7 @@
             </a:ln>
             <a:extLst>
               <a:ext uri="{91240B29-F687-4f45-9708-019B960494DF}">
-                <a14:hiddenLine xmlns:a14="http://schemas.microsoft.com/office/drawing/2010/main" xmlns="" w="9525">
+                <a14:hiddenLine xmlns="" xmlns:a14="http://schemas.microsoft.com/office/drawing/2010/main" w="9525">
                   <a:solidFill>
                     <a:srgbClr val="000000"/>
                   </a:solidFill>
@@ -3730,7 +3730,7 @@
             </a:ln>
             <a:extLst>
               <a:ext uri="{91240B29-F687-4f45-9708-019B960494DF}">
-                <a14:hiddenLine xmlns:a14="http://schemas.microsoft.com/office/drawing/2010/main" xmlns="" w="9525">
+                <a14:hiddenLine xmlns="" xmlns:a14="http://schemas.microsoft.com/office/drawing/2010/main" w="9525">
                   <a:solidFill>
                     <a:srgbClr val="000000"/>
                   </a:solidFill>
@@ -3820,7 +3820,7 @@
             </a:ln>
             <a:extLst>
               <a:ext uri="{91240B29-F687-4f45-9708-019B960494DF}">
-                <a14:hiddenLine xmlns:a14="http://schemas.microsoft.com/office/drawing/2010/main" xmlns="" w="9525">
+                <a14:hiddenLine xmlns="" xmlns:a14="http://schemas.microsoft.com/office/drawing/2010/main" w="9525">
                   <a:solidFill>
                     <a:srgbClr val="000000"/>
                   </a:solidFill>
@@ -3910,7 +3910,7 @@
             </a:ln>
             <a:extLst>
               <a:ext uri="{91240B29-F687-4f45-9708-019B960494DF}">
-                <a14:hiddenLine xmlns:a14="http://schemas.microsoft.com/office/drawing/2010/main" xmlns="" w="9525">
+                <a14:hiddenLine xmlns="" xmlns:a14="http://schemas.microsoft.com/office/drawing/2010/main" w="9525">
                   <a:solidFill>
                     <a:srgbClr val="000000"/>
                   </a:solidFill>
@@ -3972,7 +3972,7 @@
             </a:ln>
             <a:extLst>
               <a:ext uri="{91240B29-F687-4f45-9708-019B960494DF}">
-                <a14:hiddenLine xmlns:a14="http://schemas.microsoft.com/office/drawing/2010/main" xmlns="" w="9525">
+                <a14:hiddenLine xmlns="" xmlns:a14="http://schemas.microsoft.com/office/drawing/2010/main" w="9525">
                   <a:solidFill>
                     <a:srgbClr val="000000"/>
                   </a:solidFill>
@@ -4092,7 +4092,7 @@
             </a:ln>
             <a:extLst>
               <a:ext uri="{91240B29-F687-4f45-9708-019B960494DF}">
-                <a14:hiddenLine xmlns:a14="http://schemas.microsoft.com/office/drawing/2010/main" xmlns="" w="9525">
+                <a14:hiddenLine xmlns="" xmlns:a14="http://schemas.microsoft.com/office/drawing/2010/main" w="9525">
                   <a:solidFill>
                     <a:srgbClr val="000000"/>
                   </a:solidFill>
@@ -4160,7 +4160,7 @@
             </a:ln>
             <a:extLst>
               <a:ext uri="{91240B29-F687-4f45-9708-019B960494DF}">
-                <a14:hiddenLine xmlns:a14="http://schemas.microsoft.com/office/drawing/2010/main" xmlns="" w="9525">
+                <a14:hiddenLine xmlns="" xmlns:a14="http://schemas.microsoft.com/office/drawing/2010/main" w="9525">
                   <a:solidFill>
                     <a:srgbClr val="000000"/>
                   </a:solidFill>
@@ -4250,7 +4250,7 @@
             </a:ln>
             <a:extLst>
               <a:ext uri="{91240B29-F687-4f45-9708-019B960494DF}">
-                <a14:hiddenLine xmlns:a14="http://schemas.microsoft.com/office/drawing/2010/main" xmlns="" w="9525">
+                <a14:hiddenLine xmlns="" xmlns:a14="http://schemas.microsoft.com/office/drawing/2010/main" w="9525">
                   <a:solidFill>
                     <a:srgbClr val="000000"/>
                   </a:solidFill>
@@ -4390,7 +4390,7 @@
           <a:p>
             <a:fld id="{48A87A34-81AB-432B-8DAE-1953F412C126}" type="datetimeFigureOut">
               <a:rPr lang="en-US" dirty="0"/>
-              <a:t>3/7/2023</a:t>
+              <a:t>3/10/2023</a:t>
             </a:fld>
             <a:endParaRPr lang="en-US" dirty="0"/>
           </a:p>
@@ -4652,7 +4652,7 @@
           <a:p>
             <a:fld id="{48A87A34-81AB-432B-8DAE-1953F412C126}" type="datetimeFigureOut">
               <a:rPr lang="en-US" dirty="0"/>
-              <a:t>3/7/2023</a:t>
+              <a:t>3/10/2023</a:t>
             </a:fld>
             <a:endParaRPr lang="en-US" dirty="0"/>
           </a:p>
@@ -4843,7 +4843,7 @@
           <a:p>
             <a:fld id="{48A87A34-81AB-432B-8DAE-1953F412C126}" type="datetimeFigureOut">
               <a:rPr lang="en-US" dirty="0"/>
-              <a:t>3/7/2023</a:t>
+              <a:t>3/10/2023</a:t>
             </a:fld>
             <a:endParaRPr lang="en-US" dirty="0"/>
           </a:p>
@@ -5101,7 +5101,7 @@
           <a:p>
             <a:fld id="{48A87A34-81AB-432B-8DAE-1953F412C126}" type="datetimeFigureOut">
               <a:rPr lang="en-US" dirty="0"/>
-              <a:t>3/7/2023</a:t>
+              <a:t>3/10/2023</a:t>
             </a:fld>
             <a:endParaRPr lang="en-US" dirty="0"/>
           </a:p>
@@ -5530,7 +5530,7 @@
           <a:p>
             <a:fld id="{48A87A34-81AB-432B-8DAE-1953F412C126}" type="datetimeFigureOut">
               <a:rPr lang="en-US" dirty="0"/>
-              <a:t>3/7/2023</a:t>
+              <a:t>3/10/2023</a:t>
             </a:fld>
             <a:endParaRPr lang="en-US" dirty="0"/>
           </a:p>
@@ -6071,7 +6071,7 @@
           <a:p>
             <a:fld id="{48A87A34-81AB-432B-8DAE-1953F412C126}" type="datetimeFigureOut">
               <a:rPr lang="en-US" dirty="0"/>
-              <a:t>3/7/2023</a:t>
+              <a:t>3/10/2023</a:t>
             </a:fld>
             <a:endParaRPr lang="en-US" dirty="0"/>
           </a:p>
@@ -6786,7 +6786,7 @@
           <a:p>
             <a:fld id="{48A87A34-81AB-432B-8DAE-1953F412C126}" type="datetimeFigureOut">
               <a:rPr lang="en-US" dirty="0"/>
-              <a:t>3/7/2023</a:t>
+              <a:t>3/10/2023</a:t>
             </a:fld>
             <a:endParaRPr lang="en-US" dirty="0"/>
           </a:p>
@@ -6951,7 +6951,7 @@
           <a:p>
             <a:fld id="{48A87A34-81AB-432B-8DAE-1953F412C126}" type="datetimeFigureOut">
               <a:rPr lang="en-US" dirty="0"/>
-              <a:t>3/7/2023</a:t>
+              <a:t>3/10/2023</a:t>
             </a:fld>
             <a:endParaRPr lang="en-US" dirty="0"/>
           </a:p>
@@ -7126,7 +7126,7 @@
           <a:p>
             <a:fld id="{48A87A34-81AB-432B-8DAE-1953F412C126}" type="datetimeFigureOut">
               <a:rPr lang="en-US" dirty="0"/>
-              <a:t>3/7/2023</a:t>
+              <a:t>3/10/2023</a:t>
             </a:fld>
             <a:endParaRPr lang="en-US" dirty="0"/>
           </a:p>
@@ -7291,7 +7291,7 @@
           <a:p>
             <a:fld id="{48A87A34-81AB-432B-8DAE-1953F412C126}" type="datetimeFigureOut">
               <a:rPr lang="en-US" dirty="0"/>
-              <a:t>3/7/2023</a:t>
+              <a:t>3/10/2023</a:t>
             </a:fld>
             <a:endParaRPr lang="en-US" dirty="0"/>
           </a:p>
@@ -7536,7 +7536,7 @@
           <a:p>
             <a:fld id="{48A87A34-81AB-432B-8DAE-1953F412C126}" type="datetimeFigureOut">
               <a:rPr lang="en-US" dirty="0"/>
-              <a:t>3/7/2023</a:t>
+              <a:t>3/10/2023</a:t>
             </a:fld>
             <a:endParaRPr lang="en-US" dirty="0"/>
           </a:p>
@@ -7763,7 +7763,7 @@
           <a:p>
             <a:fld id="{48A87A34-81AB-432B-8DAE-1953F412C126}" type="datetimeFigureOut">
               <a:rPr lang="en-US" dirty="0"/>
-              <a:t>3/7/2023</a:t>
+              <a:t>3/10/2023</a:t>
             </a:fld>
             <a:endParaRPr lang="en-US" dirty="0"/>
           </a:p>
@@ -8139,7 +8139,7 @@
           <a:p>
             <a:fld id="{48A87A34-81AB-432B-8DAE-1953F412C126}" type="datetimeFigureOut">
               <a:rPr lang="en-US" dirty="0"/>
-              <a:t>3/7/2023</a:t>
+              <a:t>3/10/2023</a:t>
             </a:fld>
             <a:endParaRPr lang="en-US" dirty="0"/>
           </a:p>
@@ -8252,7 +8252,7 @@
           <a:p>
             <a:fld id="{48A87A34-81AB-432B-8DAE-1953F412C126}" type="datetimeFigureOut">
               <a:rPr lang="en-US" dirty="0"/>
-              <a:t>3/7/2023</a:t>
+              <a:t>3/10/2023</a:t>
             </a:fld>
             <a:endParaRPr lang="en-US" dirty="0"/>
           </a:p>
@@ -8342,7 +8342,7 @@
           <a:p>
             <a:fld id="{48A87A34-81AB-432B-8DAE-1953F412C126}" type="datetimeFigureOut">
               <a:rPr lang="en-US" dirty="0"/>
-              <a:t>3/7/2023</a:t>
+              <a:t>3/10/2023</a:t>
             </a:fld>
             <a:endParaRPr lang="en-US" dirty="0"/>
           </a:p>
@@ -8586,7 +8586,7 @@
           <a:p>
             <a:fld id="{48A87A34-81AB-432B-8DAE-1953F412C126}" type="datetimeFigureOut">
               <a:rPr lang="en-US" dirty="0"/>
-              <a:t>3/7/2023</a:t>
+              <a:t>3/10/2023</a:t>
             </a:fld>
             <a:endParaRPr lang="en-US" dirty="0"/>
           </a:p>
@@ -8861,7 +8861,7 @@
           <a:p>
             <a:fld id="{48A87A34-81AB-432B-8DAE-1953F412C126}" type="datetimeFigureOut">
               <a:rPr lang="en-US" dirty="0"/>
-              <a:t>3/7/2023</a:t>
+              <a:t>3/10/2023</a:t>
             </a:fld>
             <a:endParaRPr lang="en-US" dirty="0"/>
           </a:p>
@@ -8972,7 +8972,7 @@
           <a:noFill/>
           <a:extLst>
             <a:ext uri="{909E8E84-426E-40dd-AFC4-6F175D3DCCD1}">
-              <a14:hiddenFill xmlns:a14="http://schemas.microsoft.com/office/drawing/2010/main" xmlns="">
+              <a14:hiddenFill xmlns="" xmlns:a14="http://schemas.microsoft.com/office/drawing/2010/main">
                 <a:solidFill>
                   <a:srgbClr val="FFFFFF"/>
                 </a:solidFill>
@@ -9046,7 +9046,7 @@
               </a:ln>
               <a:extLst>
                 <a:ext uri="{91240B29-F687-4f45-9708-019B960494DF}">
-                  <a14:hiddenLine xmlns:a14="http://schemas.microsoft.com/office/drawing/2010/main" xmlns="" w="9525">
+                  <a14:hiddenLine xmlns="" xmlns:a14="http://schemas.microsoft.com/office/drawing/2010/main" w="9525">
                     <a:solidFill>
                       <a:srgbClr val="000000"/>
                     </a:solidFill>
@@ -9136,7 +9136,7 @@
               </a:ln>
               <a:extLst>
                 <a:ext uri="{91240B29-F687-4f45-9708-019B960494DF}">
-                  <a14:hiddenLine xmlns:a14="http://schemas.microsoft.com/office/drawing/2010/main" xmlns="" w="9525">
+                  <a14:hiddenLine xmlns="" xmlns:a14="http://schemas.microsoft.com/office/drawing/2010/main" w="9525">
                     <a:solidFill>
                       <a:srgbClr val="000000"/>
                     </a:solidFill>
@@ -9226,7 +9226,7 @@
               </a:ln>
               <a:extLst>
                 <a:ext uri="{91240B29-F687-4f45-9708-019B960494DF}">
-                  <a14:hiddenLine xmlns:a14="http://schemas.microsoft.com/office/drawing/2010/main" xmlns="" w="9525">
+                  <a14:hiddenLine xmlns="" xmlns:a14="http://schemas.microsoft.com/office/drawing/2010/main" w="9525">
                     <a:solidFill>
                       <a:srgbClr val="000000"/>
                     </a:solidFill>
@@ -9288,7 +9288,7 @@
               </a:ln>
               <a:extLst>
                 <a:ext uri="{91240B29-F687-4f45-9708-019B960494DF}">
-                  <a14:hiddenLine xmlns:a14="http://schemas.microsoft.com/office/drawing/2010/main" xmlns="" w="9525">
+                  <a14:hiddenLine xmlns="" xmlns:a14="http://schemas.microsoft.com/office/drawing/2010/main" w="9525">
                     <a:solidFill>
                       <a:srgbClr val="000000"/>
                     </a:solidFill>
@@ -9378,7 +9378,7 @@
               </a:ln>
               <a:extLst>
                 <a:ext uri="{91240B29-F687-4f45-9708-019B960494DF}">
-                  <a14:hiddenLine xmlns:a14="http://schemas.microsoft.com/office/drawing/2010/main" xmlns="" w="9525">
+                  <a14:hiddenLine xmlns="" xmlns:a14="http://schemas.microsoft.com/office/drawing/2010/main" w="9525">
                     <a:solidFill>
                       <a:srgbClr val="000000"/>
                     </a:solidFill>
@@ -9440,7 +9440,7 @@
               </a:ln>
               <a:extLst>
                 <a:ext uri="{91240B29-F687-4f45-9708-019B960494DF}">
-                  <a14:hiddenLine xmlns:a14="http://schemas.microsoft.com/office/drawing/2010/main" xmlns="" w="9525">
+                  <a14:hiddenLine xmlns="" xmlns:a14="http://schemas.microsoft.com/office/drawing/2010/main" w="9525">
                     <a:solidFill>
                       <a:srgbClr val="000000"/>
                     </a:solidFill>
@@ -9502,7 +9502,7 @@
               </a:ln>
               <a:extLst>
                 <a:ext uri="{91240B29-F687-4f45-9708-019B960494DF}">
-                  <a14:hiddenLine xmlns:a14="http://schemas.microsoft.com/office/drawing/2010/main" xmlns="" w="9525">
+                  <a14:hiddenLine xmlns="" xmlns:a14="http://schemas.microsoft.com/office/drawing/2010/main" w="9525">
                     <a:solidFill>
                       <a:srgbClr val="000000"/>
                     </a:solidFill>
@@ -9592,7 +9592,7 @@
               </a:ln>
               <a:extLst>
                 <a:ext uri="{91240B29-F687-4f45-9708-019B960494DF}">
-                  <a14:hiddenLine xmlns:a14="http://schemas.microsoft.com/office/drawing/2010/main" xmlns="" w="9525">
+                  <a14:hiddenLine xmlns="" xmlns:a14="http://schemas.microsoft.com/office/drawing/2010/main" w="9525">
                     <a:solidFill>
                       <a:srgbClr val="000000"/>
                     </a:solidFill>
@@ -9682,7 +9682,7 @@
               </a:ln>
               <a:extLst>
                 <a:ext uri="{91240B29-F687-4f45-9708-019B960494DF}">
-                  <a14:hiddenLine xmlns:a14="http://schemas.microsoft.com/office/drawing/2010/main" xmlns="" w="9525">
+                  <a14:hiddenLine xmlns="" xmlns:a14="http://schemas.microsoft.com/office/drawing/2010/main" w="9525">
                     <a:solidFill>
                       <a:srgbClr val="000000"/>
                     </a:solidFill>
@@ -9744,7 +9744,7 @@
               </a:ln>
               <a:extLst>
                 <a:ext uri="{91240B29-F687-4f45-9708-019B960494DF}">
-                  <a14:hiddenLine xmlns:a14="http://schemas.microsoft.com/office/drawing/2010/main" xmlns="" w="9525">
+                  <a14:hiddenLine xmlns="" xmlns:a14="http://schemas.microsoft.com/office/drawing/2010/main" w="9525">
                     <a:solidFill>
                       <a:srgbClr val="000000"/>
                     </a:solidFill>
@@ -9854,7 +9854,7 @@
               </a:ln>
               <a:extLst>
                 <a:ext uri="{91240B29-F687-4f45-9708-019B960494DF}">
-                  <a14:hiddenLine xmlns:a14="http://schemas.microsoft.com/office/drawing/2010/main" xmlns="" w="9525">
+                  <a14:hiddenLine xmlns="" xmlns:a14="http://schemas.microsoft.com/office/drawing/2010/main" w="9525">
                     <a:solidFill>
                       <a:srgbClr val="000000"/>
                     </a:solidFill>
@@ -9938,7 +9938,7 @@
               </a:ln>
               <a:extLst>
                 <a:ext uri="{91240B29-F687-4f45-9708-019B960494DF}">
-                  <a14:hiddenLine xmlns:a14="http://schemas.microsoft.com/office/drawing/2010/main" xmlns="" w="9525">
+                  <a14:hiddenLine xmlns="" xmlns:a14="http://schemas.microsoft.com/office/drawing/2010/main" w="9525">
                     <a:solidFill>
                       <a:srgbClr val="000000"/>
                     </a:solidFill>
@@ -10000,7 +10000,7 @@
               </a:ln>
               <a:extLst>
                 <a:ext uri="{91240B29-F687-4f45-9708-019B960494DF}">
-                  <a14:hiddenLine xmlns:a14="http://schemas.microsoft.com/office/drawing/2010/main" xmlns="" w="9525">
+                  <a14:hiddenLine xmlns="" xmlns:a14="http://schemas.microsoft.com/office/drawing/2010/main" w="9525">
                     <a:solidFill>
                       <a:srgbClr val="000000"/>
                     </a:solidFill>
@@ -10062,7 +10062,7 @@
               </a:ln>
               <a:extLst>
                 <a:ext uri="{91240B29-F687-4f45-9708-019B960494DF}">
-                  <a14:hiddenLine xmlns:a14="http://schemas.microsoft.com/office/drawing/2010/main" xmlns="" w="9525">
+                  <a14:hiddenLine xmlns="" xmlns:a14="http://schemas.microsoft.com/office/drawing/2010/main" w="9525">
                     <a:solidFill>
                       <a:srgbClr val="000000"/>
                     </a:solidFill>
@@ -10152,7 +10152,7 @@
               </a:ln>
               <a:extLst>
                 <a:ext uri="{91240B29-F687-4f45-9708-019B960494DF}">
-                  <a14:hiddenLine xmlns:a14="http://schemas.microsoft.com/office/drawing/2010/main" xmlns="" w="9525">
+                  <a14:hiddenLine xmlns="" xmlns:a14="http://schemas.microsoft.com/office/drawing/2010/main" w="9525">
                     <a:solidFill>
                       <a:srgbClr val="000000"/>
                     </a:solidFill>
@@ -10186,7 +10186,7 @@
               </a:ln>
               <a:extLst>
                 <a:ext uri="{91240B29-F687-4f45-9708-019B960494DF}">
-                  <a14:hiddenLine xmlns:a14="http://schemas.microsoft.com/office/drawing/2010/main" xmlns="" w="9525">
+                  <a14:hiddenLine xmlns="" xmlns:a14="http://schemas.microsoft.com/office/drawing/2010/main" w="9525">
                     <a:solidFill>
                       <a:srgbClr val="000000"/>
                     </a:solidFill>
@@ -10251,7 +10251,7 @@
               </a:ln>
               <a:extLst>
                 <a:ext uri="{91240B29-F687-4f45-9708-019B960494DF}">
-                  <a14:hiddenLine xmlns:a14="http://schemas.microsoft.com/office/drawing/2010/main" xmlns="" w="9525">
+                  <a14:hiddenLine xmlns="" xmlns:a14="http://schemas.microsoft.com/office/drawing/2010/main" w="9525">
                     <a:solidFill>
                       <a:srgbClr val="000000"/>
                     </a:solidFill>
@@ -10341,7 +10341,7 @@
               </a:ln>
               <a:extLst>
                 <a:ext uri="{91240B29-F687-4f45-9708-019B960494DF}">
-                  <a14:hiddenLine xmlns:a14="http://schemas.microsoft.com/office/drawing/2010/main" xmlns="" w="9525">
+                  <a14:hiddenLine xmlns="" xmlns:a14="http://schemas.microsoft.com/office/drawing/2010/main" w="9525">
                     <a:solidFill>
                       <a:srgbClr val="000000"/>
                     </a:solidFill>
@@ -10403,7 +10403,7 @@
               </a:ln>
               <a:extLst>
                 <a:ext uri="{91240B29-F687-4f45-9708-019B960494DF}">
-                  <a14:hiddenLine xmlns:a14="http://schemas.microsoft.com/office/drawing/2010/main" xmlns="" w="9525">
+                  <a14:hiddenLine xmlns="" xmlns:a14="http://schemas.microsoft.com/office/drawing/2010/main" w="9525">
                     <a:solidFill>
                       <a:srgbClr val="000000"/>
                     </a:solidFill>
@@ -10493,7 +10493,7 @@
               </a:ln>
               <a:extLst>
                 <a:ext uri="{91240B29-F687-4f45-9708-019B960494DF}">
-                  <a14:hiddenLine xmlns:a14="http://schemas.microsoft.com/office/drawing/2010/main" xmlns="" w="9525">
+                  <a14:hiddenLine xmlns="" xmlns:a14="http://schemas.microsoft.com/office/drawing/2010/main" w="9525">
                     <a:solidFill>
                       <a:srgbClr val="000000"/>
                     </a:solidFill>
@@ -10558,7 +10558,7 @@
               </a:ln>
               <a:extLst>
                 <a:ext uri="{91240B29-F687-4f45-9708-019B960494DF}">
-                  <a14:hiddenLine xmlns:a14="http://schemas.microsoft.com/office/drawing/2010/main" xmlns="" w="9525">
+                  <a14:hiddenLine xmlns="" xmlns:a14="http://schemas.microsoft.com/office/drawing/2010/main" w="9525">
                     <a:solidFill>
                       <a:srgbClr val="000000"/>
                     </a:solidFill>
@@ -10620,7 +10620,7 @@
               </a:ln>
               <a:extLst>
                 <a:ext uri="{91240B29-F687-4f45-9708-019B960494DF}">
-                  <a14:hiddenLine xmlns:a14="http://schemas.microsoft.com/office/drawing/2010/main" xmlns="" w="9525">
+                  <a14:hiddenLine xmlns="" xmlns:a14="http://schemas.microsoft.com/office/drawing/2010/main" w="9525">
                     <a:solidFill>
                       <a:srgbClr val="000000"/>
                     </a:solidFill>
@@ -10710,7 +10710,7 @@
               </a:ln>
               <a:extLst>
                 <a:ext uri="{91240B29-F687-4f45-9708-019B960494DF}">
-                  <a14:hiddenLine xmlns:a14="http://schemas.microsoft.com/office/drawing/2010/main" xmlns="" w="9525">
+                  <a14:hiddenLine xmlns="" xmlns:a14="http://schemas.microsoft.com/office/drawing/2010/main" w="9525">
                     <a:solidFill>
                       <a:srgbClr val="000000"/>
                     </a:solidFill>
@@ -10800,7 +10800,7 @@
               </a:ln>
               <a:extLst>
                 <a:ext uri="{91240B29-F687-4f45-9708-019B960494DF}">
-                  <a14:hiddenLine xmlns:a14="http://schemas.microsoft.com/office/drawing/2010/main" xmlns="" w="9525">
+                  <a14:hiddenLine xmlns="" xmlns:a14="http://schemas.microsoft.com/office/drawing/2010/main" w="9525">
                     <a:solidFill>
                       <a:srgbClr val="000000"/>
                     </a:solidFill>
@@ -10865,7 +10865,7 @@
               </a:ln>
               <a:extLst>
                 <a:ext uri="{91240B29-F687-4f45-9708-019B960494DF}">
-                  <a14:hiddenLine xmlns:a14="http://schemas.microsoft.com/office/drawing/2010/main" xmlns="" w="9525">
+                  <a14:hiddenLine xmlns="" xmlns:a14="http://schemas.microsoft.com/office/drawing/2010/main" w="9525">
                     <a:solidFill>
                       <a:srgbClr val="000000"/>
                     </a:solidFill>
@@ -10985,7 +10985,7 @@
               </a:ln>
               <a:extLst>
                 <a:ext uri="{91240B29-F687-4f45-9708-019B960494DF}">
-                  <a14:hiddenLine xmlns:a14="http://schemas.microsoft.com/office/drawing/2010/main" xmlns="" w="9525">
+                  <a14:hiddenLine xmlns="" xmlns:a14="http://schemas.microsoft.com/office/drawing/2010/main" w="9525">
                     <a:solidFill>
                       <a:srgbClr val="000000"/>
                     </a:solidFill>
@@ -11083,7 +11083,7 @@
               </a:ln>
               <a:extLst>
                 <a:ext uri="{91240B29-F687-4f45-9708-019B960494DF}">
-                  <a14:hiddenLine xmlns:a14="http://schemas.microsoft.com/office/drawing/2010/main" xmlns="" w="9525">
+                  <a14:hiddenLine xmlns="" xmlns:a14="http://schemas.microsoft.com/office/drawing/2010/main" w="9525">
                     <a:solidFill>
                       <a:srgbClr val="000000"/>
                     </a:solidFill>
@@ -11198,7 +11198,7 @@
               </a:ln>
               <a:extLst>
                 <a:ext uri="{91240B29-F687-4f45-9708-019B960494DF}">
-                  <a14:hiddenLine xmlns:a14="http://schemas.microsoft.com/office/drawing/2010/main" xmlns="" w="9525">
+                  <a14:hiddenLine xmlns="" xmlns:a14="http://schemas.microsoft.com/office/drawing/2010/main" w="9525">
                     <a:solidFill>
                       <a:srgbClr val="000000"/>
                     </a:solidFill>
@@ -11288,7 +11288,7 @@
               </a:ln>
               <a:extLst>
                 <a:ext uri="{91240B29-F687-4f45-9708-019B960494DF}">
-                  <a14:hiddenLine xmlns:a14="http://schemas.microsoft.com/office/drawing/2010/main" xmlns="" w="9525">
+                  <a14:hiddenLine xmlns="" xmlns:a14="http://schemas.microsoft.com/office/drawing/2010/main" w="9525">
                     <a:solidFill>
                       <a:srgbClr val="000000"/>
                     </a:solidFill>
@@ -11353,7 +11353,7 @@
               </a:ln>
               <a:extLst>
                 <a:ext uri="{91240B29-F687-4f45-9708-019B960494DF}">
-                  <a14:hiddenLine xmlns:a14="http://schemas.microsoft.com/office/drawing/2010/main" xmlns="" w="9525">
+                  <a14:hiddenLine xmlns="" xmlns:a14="http://schemas.microsoft.com/office/drawing/2010/main" w="9525">
                     <a:solidFill>
                       <a:srgbClr val="000000"/>
                     </a:solidFill>
@@ -11443,7 +11443,7 @@
               </a:ln>
               <a:extLst>
                 <a:ext uri="{91240B29-F687-4f45-9708-019B960494DF}">
-                  <a14:hiddenLine xmlns:a14="http://schemas.microsoft.com/office/drawing/2010/main" xmlns="" w="9525">
+                  <a14:hiddenLine xmlns="" xmlns:a14="http://schemas.microsoft.com/office/drawing/2010/main" w="9525">
                     <a:solidFill>
                       <a:srgbClr val="000000"/>
                     </a:solidFill>
@@ -11511,7 +11511,7 @@
               </a:ln>
               <a:extLst>
                 <a:ext uri="{91240B29-F687-4f45-9708-019B960494DF}">
-                  <a14:hiddenLine xmlns:a14="http://schemas.microsoft.com/office/drawing/2010/main" xmlns="" w="9525">
+                  <a14:hiddenLine xmlns="" xmlns:a14="http://schemas.microsoft.com/office/drawing/2010/main" w="9525">
                     <a:solidFill>
                       <a:srgbClr val="000000"/>
                     </a:solidFill>
@@ -11601,7 +11601,7 @@
               </a:ln>
               <a:extLst>
                 <a:ext uri="{91240B29-F687-4f45-9708-019B960494DF}">
-                  <a14:hiddenLine xmlns:a14="http://schemas.microsoft.com/office/drawing/2010/main" xmlns="" w="9525">
+                  <a14:hiddenLine xmlns="" xmlns:a14="http://schemas.microsoft.com/office/drawing/2010/main" w="9525">
                     <a:solidFill>
                       <a:srgbClr val="000000"/>
                     </a:solidFill>
@@ -11669,7 +11669,7 @@
               </a:ln>
               <a:extLst>
                 <a:ext uri="{91240B29-F687-4f45-9708-019B960494DF}">
-                  <a14:hiddenLine xmlns:a14="http://schemas.microsoft.com/office/drawing/2010/main" xmlns="" w="9525">
+                  <a14:hiddenLine xmlns="" xmlns:a14="http://schemas.microsoft.com/office/drawing/2010/main" w="9525">
                     <a:solidFill>
                       <a:srgbClr val="000000"/>
                     </a:solidFill>
@@ -11759,7 +11759,7 @@
               </a:ln>
               <a:extLst>
                 <a:ext uri="{91240B29-F687-4f45-9708-019B960494DF}">
-                  <a14:hiddenLine xmlns:a14="http://schemas.microsoft.com/office/drawing/2010/main" xmlns="" w="9525">
+                  <a14:hiddenLine xmlns="" xmlns:a14="http://schemas.microsoft.com/office/drawing/2010/main" w="9525">
                     <a:solidFill>
                       <a:srgbClr val="000000"/>
                     </a:solidFill>
@@ -11793,7 +11793,7 @@
               </a:ln>
               <a:extLst>
                 <a:ext uri="{91240B29-F687-4f45-9708-019B960494DF}">
-                  <a14:hiddenLine xmlns:a14="http://schemas.microsoft.com/office/drawing/2010/main" xmlns="" w="9525">
+                  <a14:hiddenLine xmlns="" xmlns:a14="http://schemas.microsoft.com/office/drawing/2010/main" w="9525">
                     <a:solidFill>
                       <a:srgbClr val="000000"/>
                     </a:solidFill>
@@ -11934,7 +11934,7 @@
             <a:fld id="{48A87A34-81AB-432B-8DAE-1953F412C126}" type="datetimeFigureOut">
               <a:rPr lang="en-US" dirty="0"/>
               <a:pPr/>
-              <a:t>3/7/2023</a:t>
+              <a:t>3/10/2023</a:t>
             </a:fld>
             <a:endParaRPr lang="en-US" dirty="0"/>
           </a:p>
@@ -12389,37 +12389,17 @@
                 <a:latin typeface="Arial" panose="020B0604020202020204" pitchFamily="34" charset="0"/>
                 <a:cs typeface="Arial" panose="020B0604020202020204" pitchFamily="34" charset="0"/>
               </a:rPr>
-              <a:t>Date de soutenance </a:t>
+              <a:t>Date de soutenance : </a:t>
             </a:r>
             <a:r>
-              <a:rPr lang="fr-FR" sz="2800" b="1" smtClean="0">
+              <a:rPr lang="fr-FR" sz="2800" b="1" dirty="0" smtClean="0">
                 <a:solidFill>
                   <a:schemeClr val="tx1"/>
                 </a:solidFill>
                 <a:latin typeface="Arial" panose="020B0604020202020204" pitchFamily="34" charset="0"/>
                 <a:cs typeface="Arial" panose="020B0604020202020204" pitchFamily="34" charset="0"/>
               </a:rPr>
-              <a:t>: </a:t>
-            </a:r>
-            <a:r>
-              <a:rPr lang="fr-FR" sz="2800" b="1" smtClean="0">
-                <a:solidFill>
-                  <a:schemeClr val="tx1"/>
-                </a:solidFill>
-                <a:latin typeface="Arial" panose="020B0604020202020204" pitchFamily="34" charset="0"/>
-                <a:cs typeface="Arial" panose="020B0604020202020204" pitchFamily="34" charset="0"/>
-              </a:rPr>
-              <a:t>__ </a:t>
-            </a:r>
-            <a:r>
-              <a:rPr lang="fr-FR" sz="2800" b="1" smtClean="0">
-                <a:solidFill>
-                  <a:srgbClr val="00B050"/>
-                </a:solidFill>
-                <a:latin typeface="Arial" panose="020B0604020202020204" pitchFamily="34" charset="0"/>
-                <a:cs typeface="Arial" panose="020B0604020202020204" pitchFamily="34" charset="0"/>
-              </a:rPr>
-              <a:t>Mars </a:t>
+              <a:t>13 </a:t>
             </a:r>
             <a:r>
               <a:rPr lang="fr-FR" sz="2800" b="1" dirty="0" smtClean="0">
@@ -12429,7 +12409,7 @@
                 <a:latin typeface="Arial" panose="020B0604020202020204" pitchFamily="34" charset="0"/>
                 <a:cs typeface="Arial" panose="020B0604020202020204" pitchFamily="34" charset="0"/>
               </a:rPr>
-              <a:t>2023</a:t>
+              <a:t>Mars 2023</a:t>
             </a:r>
             <a:endParaRPr lang="fr-FR" sz="2800" b="1" dirty="0">
               <a:solidFill>
@@ -13424,16 +13404,7 @@
                 </a:solidFill>
                 <a:latin typeface="+mn-lt"/>
               </a:rPr>
-              <a:t>Exécution de </a:t>
-            </a:r>
-            <a:r>
-              <a:rPr lang="fr-FR" sz="2200" dirty="0" smtClean="0">
-                <a:solidFill>
-                  <a:schemeClr val="tx1"/>
-                </a:solidFill>
-                <a:latin typeface="+mn-lt"/>
-              </a:rPr>
-              <a:t>l'application</a:t>
+              <a:t>Exécution de l'application</a:t>
             </a:r>
             <a:endParaRPr lang="fr-FR" sz="2200" dirty="0">
               <a:solidFill>
@@ -14066,8 +14037,8 @@
         </p:nvSpPr>
         <p:spPr>
           <a:xfrm>
-            <a:off x="944996" y="3471342"/>
-            <a:ext cx="10440000" cy="876211"/>
+            <a:off x="944996" y="3499658"/>
+            <a:ext cx="10440000" cy="847895"/>
           </a:xfrm>
           <a:prstGeom prst="rect">
             <a:avLst/>

</xml_diff>